<commit_message>
Add programming language (e.g. bash, R, awk ...) and source
</commit_message>
<xml_diff>
--- a/coordinate_systems.pptx
+++ b/coordinate_systems.pptx
@@ -197,7 +197,7 @@
           <a:p>
             <a:fld id="{E8C5F3F1-11FE-2645-A15B-0E5151586DA8}" type="datetimeFigureOut">
               <a:rPr lang="en-US" smtClean="0"/>
-              <a:t>6/27/23</a:t>
+              <a:t>7/5/23</a:t>
             </a:fld>
             <a:endParaRPr lang="en-US"/>
           </a:p>
@@ -701,7 +701,7 @@
           <a:p>
             <a:fld id="{F2BDF42A-E5EC-D543-AC7D-B4B08404DECE}" type="datetimeFigureOut">
               <a:rPr lang="en-US" smtClean="0"/>
-              <a:t>6/27/23</a:t>
+              <a:t>7/5/23</a:t>
             </a:fld>
             <a:endParaRPr lang="en-US"/>
           </a:p>
@@ -901,7 +901,7 @@
           <a:p>
             <a:fld id="{F2BDF42A-E5EC-D543-AC7D-B4B08404DECE}" type="datetimeFigureOut">
               <a:rPr lang="en-US" smtClean="0"/>
-              <a:t>6/27/23</a:t>
+              <a:t>7/5/23</a:t>
             </a:fld>
             <a:endParaRPr lang="en-US"/>
           </a:p>
@@ -1111,7 +1111,7 @@
           <a:p>
             <a:fld id="{F2BDF42A-E5EC-D543-AC7D-B4B08404DECE}" type="datetimeFigureOut">
               <a:rPr lang="en-US" smtClean="0"/>
-              <a:t>6/27/23</a:t>
+              <a:t>7/5/23</a:t>
             </a:fld>
             <a:endParaRPr lang="en-US"/>
           </a:p>
@@ -1311,7 +1311,7 @@
           <a:p>
             <a:fld id="{F2BDF42A-E5EC-D543-AC7D-B4B08404DECE}" type="datetimeFigureOut">
               <a:rPr lang="en-US" smtClean="0"/>
-              <a:t>6/27/23</a:t>
+              <a:t>7/5/23</a:t>
             </a:fld>
             <a:endParaRPr lang="en-US"/>
           </a:p>
@@ -1587,7 +1587,7 @@
           <a:p>
             <a:fld id="{F2BDF42A-E5EC-D543-AC7D-B4B08404DECE}" type="datetimeFigureOut">
               <a:rPr lang="en-US" smtClean="0"/>
-              <a:t>6/27/23</a:t>
+              <a:t>7/5/23</a:t>
             </a:fld>
             <a:endParaRPr lang="en-US"/>
           </a:p>
@@ -1855,7 +1855,7 @@
           <a:p>
             <a:fld id="{F2BDF42A-E5EC-D543-AC7D-B4B08404DECE}" type="datetimeFigureOut">
               <a:rPr lang="en-US" smtClean="0"/>
-              <a:t>6/27/23</a:t>
+              <a:t>7/5/23</a:t>
             </a:fld>
             <a:endParaRPr lang="en-US"/>
           </a:p>
@@ -2270,7 +2270,7 @@
           <a:p>
             <a:fld id="{F2BDF42A-E5EC-D543-AC7D-B4B08404DECE}" type="datetimeFigureOut">
               <a:rPr lang="en-US" smtClean="0"/>
-              <a:t>6/27/23</a:t>
+              <a:t>7/5/23</a:t>
             </a:fld>
             <a:endParaRPr lang="en-US"/>
           </a:p>
@@ -2412,7 +2412,7 @@
           <a:p>
             <a:fld id="{F2BDF42A-E5EC-D543-AC7D-B4B08404DECE}" type="datetimeFigureOut">
               <a:rPr lang="en-US" smtClean="0"/>
-              <a:t>6/27/23</a:t>
+              <a:t>7/5/23</a:t>
             </a:fld>
             <a:endParaRPr lang="en-US"/>
           </a:p>
@@ -2525,7 +2525,7 @@
           <a:p>
             <a:fld id="{F2BDF42A-E5EC-D543-AC7D-B4B08404DECE}" type="datetimeFigureOut">
               <a:rPr lang="en-US" smtClean="0"/>
-              <a:t>6/27/23</a:t>
+              <a:t>7/5/23</a:t>
             </a:fld>
             <a:endParaRPr lang="en-US"/>
           </a:p>
@@ -2838,7 +2838,7 @@
           <a:p>
             <a:fld id="{F2BDF42A-E5EC-D543-AC7D-B4B08404DECE}" type="datetimeFigureOut">
               <a:rPr lang="en-US" smtClean="0"/>
-              <a:t>6/27/23</a:t>
+              <a:t>7/5/23</a:t>
             </a:fld>
             <a:endParaRPr lang="en-US"/>
           </a:p>
@@ -3127,7 +3127,7 @@
           <a:p>
             <a:fld id="{F2BDF42A-E5EC-D543-AC7D-B4B08404DECE}" type="datetimeFigureOut">
               <a:rPr lang="en-US" smtClean="0"/>
-              <a:t>6/27/23</a:t>
+              <a:t>7/5/23</a:t>
             </a:fld>
             <a:endParaRPr lang="en-US"/>
           </a:p>
@@ -3370,7 +3370,7 @@
           <a:p>
             <a:fld id="{F2BDF42A-E5EC-D543-AC7D-B4B08404DECE}" type="datetimeFigureOut">
               <a:rPr lang="en-US" smtClean="0"/>
-              <a:t>6/27/23</a:t>
+              <a:t>7/5/23</a:t>
             </a:fld>
             <a:endParaRPr lang="en-US"/>
           </a:p>
@@ -3801,8 +3801,8 @@
         </p:nvSpPr>
         <p:spPr>
           <a:xfrm>
-            <a:off x="0" y="0"/>
-            <a:ext cx="12192000" cy="6858000"/>
+            <a:off x="0" y="-451008"/>
+            <a:ext cx="12192000" cy="7309007"/>
           </a:xfrm>
           <a:prstGeom prst="rect">
             <a:avLst/>
@@ -3856,7 +3856,7 @@
         </p:nvCxnSpPr>
         <p:spPr>
           <a:xfrm>
-            <a:off x="3969081" y="330363"/>
+            <a:off x="5319579" y="161938"/>
             <a:ext cx="0" cy="1103139"/>
           </a:xfrm>
           <a:prstGeom prst="line">
@@ -3900,7 +3900,7 @@
         </p:nvCxnSpPr>
         <p:spPr>
           <a:xfrm>
-            <a:off x="4324430" y="619432"/>
+            <a:off x="5674928" y="451007"/>
             <a:ext cx="0" cy="358877"/>
           </a:xfrm>
           <a:prstGeom prst="line">
@@ -3944,7 +3944,7 @@
         </p:nvCxnSpPr>
         <p:spPr>
           <a:xfrm flipH="1">
-            <a:off x="4685514" y="330363"/>
+            <a:off x="6036012" y="161938"/>
             <a:ext cx="1270" cy="1103134"/>
           </a:xfrm>
           <a:prstGeom prst="line">
@@ -3988,7 +3988,7 @@
         </p:nvCxnSpPr>
         <p:spPr>
           <a:xfrm>
-            <a:off x="5047152" y="619432"/>
+            <a:off x="6397650" y="451007"/>
             <a:ext cx="0" cy="358877"/>
           </a:xfrm>
           <a:prstGeom prst="line">
@@ -4032,7 +4032,7 @@
         </p:nvCxnSpPr>
         <p:spPr>
           <a:xfrm>
-            <a:off x="5405098" y="330363"/>
+            <a:off x="6755596" y="161938"/>
             <a:ext cx="0" cy="1103137"/>
           </a:xfrm>
           <a:prstGeom prst="line">
@@ -4076,7 +4076,7 @@
         </p:nvCxnSpPr>
         <p:spPr>
           <a:xfrm>
-            <a:off x="5765161" y="619432"/>
+            <a:off x="7115659" y="451007"/>
             <a:ext cx="0" cy="358877"/>
           </a:xfrm>
           <a:prstGeom prst="line">
@@ -4120,7 +4120,7 @@
         </p:nvCxnSpPr>
         <p:spPr>
           <a:xfrm>
-            <a:off x="6130963" y="330363"/>
+            <a:off x="7481461" y="161938"/>
             <a:ext cx="0" cy="1103134"/>
           </a:xfrm>
           <a:prstGeom prst="line">
@@ -4164,7 +4164,7 @@
         </p:nvCxnSpPr>
         <p:spPr>
           <a:xfrm>
-            <a:off x="6486310" y="619432"/>
+            <a:off x="7836808" y="451007"/>
             <a:ext cx="0" cy="358877"/>
           </a:xfrm>
           <a:prstGeom prst="line">
@@ -4207,7 +4207,7 @@
         </p:nvCxnSpPr>
         <p:spPr>
           <a:xfrm flipH="1">
-            <a:off x="6847398" y="330363"/>
+            <a:off x="8197896" y="161938"/>
             <a:ext cx="187" cy="1098063"/>
           </a:xfrm>
           <a:prstGeom prst="line">
@@ -4251,7 +4251,7 @@
         </p:nvCxnSpPr>
         <p:spPr>
           <a:xfrm>
-            <a:off x="7212175" y="619432"/>
+            <a:off x="8562673" y="451007"/>
             <a:ext cx="0" cy="358877"/>
           </a:xfrm>
           <a:prstGeom prst="line">
@@ -4295,7 +4295,7 @@
         </p:nvCxnSpPr>
         <p:spPr>
           <a:xfrm>
-            <a:off x="7558462" y="330363"/>
+            <a:off x="8908960" y="161938"/>
             <a:ext cx="659" cy="1103135"/>
           </a:xfrm>
           <a:prstGeom prst="line">
@@ -4339,7 +4339,7 @@
         </p:nvCxnSpPr>
         <p:spPr>
           <a:xfrm>
-            <a:off x="7923899" y="619432"/>
+            <a:off x="9274397" y="451007"/>
             <a:ext cx="0" cy="358877"/>
           </a:xfrm>
           <a:prstGeom prst="line">
@@ -4383,7 +4383,7 @@
         </p:nvCxnSpPr>
         <p:spPr>
           <a:xfrm>
-            <a:off x="8290088" y="330363"/>
+            <a:off x="9640586" y="161938"/>
             <a:ext cx="0" cy="1103134"/>
           </a:xfrm>
           <a:prstGeom prst="line">
@@ -4425,7 +4425,7 @@
         </p:nvSpPr>
         <p:spPr>
           <a:xfrm>
-            <a:off x="3726997" y="1433502"/>
+            <a:off x="5077495" y="1265077"/>
             <a:ext cx="484168" cy="461665"/>
           </a:xfrm>
           <a:prstGeom prst="rect">
@@ -4473,7 +4473,7 @@
         </p:nvSpPr>
         <p:spPr>
           <a:xfrm>
-            <a:off x="4443430" y="1433497"/>
+            <a:off x="5793928" y="1265072"/>
             <a:ext cx="484168" cy="461665"/>
           </a:xfrm>
           <a:prstGeom prst="rect">
@@ -4521,7 +4521,7 @@
         </p:nvSpPr>
         <p:spPr>
           <a:xfrm>
-            <a:off x="5163014" y="1433500"/>
+            <a:off x="6513512" y="1265075"/>
             <a:ext cx="484168" cy="461665"/>
           </a:xfrm>
           <a:prstGeom prst="rect">
@@ -4569,7 +4569,7 @@
         </p:nvSpPr>
         <p:spPr>
           <a:xfrm>
-            <a:off x="5888879" y="1433497"/>
+            <a:off x="7239377" y="1265072"/>
             <a:ext cx="484168" cy="461665"/>
           </a:xfrm>
           <a:prstGeom prst="rect">
@@ -4617,7 +4617,7 @@
         </p:nvSpPr>
         <p:spPr>
           <a:xfrm>
-            <a:off x="6605312" y="1433498"/>
+            <a:off x="7955810" y="1265073"/>
             <a:ext cx="484168" cy="461665"/>
           </a:xfrm>
           <a:prstGeom prst="rect">
@@ -4665,7 +4665,7 @@
         </p:nvSpPr>
         <p:spPr>
           <a:xfrm>
-            <a:off x="7317037" y="1433498"/>
+            <a:off x="8667535" y="1265073"/>
             <a:ext cx="484168" cy="461665"/>
           </a:xfrm>
           <a:prstGeom prst="rect">
@@ -4713,7 +4713,7 @@
         </p:nvSpPr>
         <p:spPr>
           <a:xfrm>
-            <a:off x="8048004" y="1433497"/>
+            <a:off x="9398502" y="1265072"/>
             <a:ext cx="484168" cy="461665"/>
           </a:xfrm>
           <a:prstGeom prst="rect">
@@ -4761,7 +4761,7 @@
         </p:nvSpPr>
         <p:spPr>
           <a:xfrm>
-            <a:off x="4074221" y="971832"/>
+            <a:off x="5424719" y="803407"/>
             <a:ext cx="484168" cy="461665"/>
           </a:xfrm>
           <a:prstGeom prst="rect">
@@ -4822,7 +4822,7 @@
         </p:nvSpPr>
         <p:spPr>
           <a:xfrm>
-            <a:off x="4799377" y="971831"/>
+            <a:off x="6149875" y="803406"/>
             <a:ext cx="484168" cy="461665"/>
           </a:xfrm>
           <a:prstGeom prst="rect">
@@ -4883,7 +4883,7 @@
         </p:nvSpPr>
         <p:spPr>
           <a:xfrm>
-            <a:off x="5528517" y="978309"/>
+            <a:off x="6879015" y="809884"/>
             <a:ext cx="484168" cy="461665"/>
           </a:xfrm>
           <a:prstGeom prst="rect">
@@ -4944,7 +4944,7 @@
         </p:nvSpPr>
         <p:spPr>
           <a:xfrm>
-            <a:off x="6239640" y="985038"/>
+            <a:off x="7590138" y="816613"/>
             <a:ext cx="484168" cy="461665"/>
           </a:xfrm>
           <a:prstGeom prst="rect">
@@ -5005,7 +5005,7 @@
         </p:nvSpPr>
         <p:spPr>
           <a:xfrm>
-            <a:off x="6970984" y="985038"/>
+            <a:off x="8321482" y="816613"/>
             <a:ext cx="484168" cy="461665"/>
           </a:xfrm>
           <a:prstGeom prst="rect">
@@ -5066,7 +5066,7 @@
         </p:nvSpPr>
         <p:spPr>
           <a:xfrm>
-            <a:off x="7681861" y="978308"/>
+            <a:off x="9032359" y="809883"/>
             <a:ext cx="484168" cy="461665"/>
           </a:xfrm>
           <a:prstGeom prst="rect">
@@ -5127,7 +5127,7 @@
         </p:nvSpPr>
         <p:spPr>
           <a:xfrm>
-            <a:off x="4142677" y="164244"/>
+            <a:off x="5493175" y="-4181"/>
             <a:ext cx="362600" cy="461665"/>
           </a:xfrm>
           <a:prstGeom prst="rect">
@@ -5175,7 +5175,7 @@
         </p:nvSpPr>
         <p:spPr>
           <a:xfrm>
-            <a:off x="4881383" y="179647"/>
+            <a:off x="6231881" y="11222"/>
             <a:ext cx="335348" cy="461665"/>
           </a:xfrm>
           <a:prstGeom prst="rect">
@@ -5233,7 +5233,7 @@
         </p:nvSpPr>
         <p:spPr>
           <a:xfrm>
-            <a:off x="5584979" y="191445"/>
+            <a:off x="6935477" y="23020"/>
             <a:ext cx="378630" cy="461665"/>
           </a:xfrm>
           <a:prstGeom prst="rect">
@@ -5291,7 +5291,7 @@
         </p:nvSpPr>
         <p:spPr>
           <a:xfrm>
-            <a:off x="6298085" y="195049"/>
+            <a:off x="7648583" y="26624"/>
             <a:ext cx="348172" cy="461665"/>
           </a:xfrm>
           <a:prstGeom prst="rect">
@@ -5339,7 +5339,7 @@
         </p:nvSpPr>
         <p:spPr>
           <a:xfrm>
-            <a:off x="7031387" y="191445"/>
+            <a:off x="8381885" y="23020"/>
             <a:ext cx="362600" cy="461665"/>
           </a:xfrm>
           <a:prstGeom prst="rect">
@@ -5387,7 +5387,7 @@
         </p:nvSpPr>
         <p:spPr>
           <a:xfrm>
-            <a:off x="7754050" y="200947"/>
+            <a:off x="9104548" y="32522"/>
             <a:ext cx="335348" cy="461665"/>
           </a:xfrm>
           <a:prstGeom prst="rect">
@@ -5445,7 +5445,7 @@
         </p:nvSpPr>
         <p:spPr>
           <a:xfrm>
-            <a:off x="924436" y="986399"/>
+            <a:off x="2274934" y="817974"/>
             <a:ext cx="2817088" cy="461665"/>
           </a:xfrm>
           <a:prstGeom prst="rect">
@@ -5513,7 +5513,7 @@
         </p:nvSpPr>
         <p:spPr>
           <a:xfrm>
-            <a:off x="908502" y="1399754"/>
+            <a:off x="2259000" y="1231329"/>
             <a:ext cx="2824052" cy="461665"/>
           </a:xfrm>
           <a:prstGeom prst="rect">
@@ -5623,14 +5623,14 @@
           <p:nvPr>
             <p:extLst>
               <p:ext uri="{D42A27DB-BD31-4B8C-83A1-F6EECF244321}">
-                <p14:modId xmlns:p14="http://schemas.microsoft.com/office/powerpoint/2010/main" val="637513066"/>
+                <p14:modId xmlns:p14="http://schemas.microsoft.com/office/powerpoint/2010/main" val="1931433467"/>
               </p:ext>
             </p:extLst>
           </p:nvPr>
         </p:nvGraphicFramePr>
         <p:xfrm>
-          <a:off x="679579" y="1991121"/>
-          <a:ext cx="10832842" cy="3992880"/>
+          <a:off x="279390" y="1943037"/>
+          <a:ext cx="11633220" cy="3771937"/>
         </p:xfrm>
         <a:graphic>
           <a:graphicData uri="http://schemas.openxmlformats.org/drawingml/2006/table">
@@ -5639,49 +5639,49 @@
                 <a:tableStyleId>{5C22544A-7EE6-4342-B048-85BDC9FD1C3A}</a:tableStyleId>
               </a:tblPr>
               <a:tblGrid>
-                <a:gridCol w="1989709">
+                <a:gridCol w="2136717">
                   <a:extLst>
                     <a:ext uri="{9D8B030D-6E8A-4147-A177-3AD203B41FA5}">
                       <a16:colId xmlns:a16="http://schemas.microsoft.com/office/drawing/2014/main" val="1582267009"/>
                     </a:ext>
                   </a:extLst>
                 </a:gridCol>
-                <a:gridCol w="1050086">
+                <a:gridCol w="1127671">
                   <a:extLst>
                     <a:ext uri="{9D8B030D-6E8A-4147-A177-3AD203B41FA5}">
                       <a16:colId xmlns:a16="http://schemas.microsoft.com/office/drawing/2014/main" val="2579513661"/>
                     </a:ext>
                   </a:extLst>
                 </a:gridCol>
-                <a:gridCol w="1008789">
+                <a:gridCol w="1083323">
                   <a:extLst>
                     <a:ext uri="{9D8B030D-6E8A-4147-A177-3AD203B41FA5}">
                       <a16:colId xmlns:a16="http://schemas.microsoft.com/office/drawing/2014/main" val="3324607577"/>
                     </a:ext>
                   </a:extLst>
                 </a:gridCol>
-                <a:gridCol w="1286060">
+                <a:gridCol w="1362105">
                   <a:extLst>
                     <a:ext uri="{9D8B030D-6E8A-4147-A177-3AD203B41FA5}">
                       <a16:colId xmlns:a16="http://schemas.microsoft.com/office/drawing/2014/main" val="2839749170"/>
                     </a:ext>
                   </a:extLst>
                 </a:gridCol>
-                <a:gridCol w="1339153">
+                <a:gridCol w="1674961">
                   <a:extLst>
                     <a:ext uri="{9D8B030D-6E8A-4147-A177-3AD203B41FA5}">
                       <a16:colId xmlns:a16="http://schemas.microsoft.com/office/drawing/2014/main" val="4234825426"/>
                     </a:ext>
                   </a:extLst>
                 </a:gridCol>
-                <a:gridCol w="2235856">
+                <a:gridCol w="2307101">
                   <a:extLst>
                     <a:ext uri="{9D8B030D-6E8A-4147-A177-3AD203B41FA5}">
                       <a16:colId xmlns:a16="http://schemas.microsoft.com/office/drawing/2014/main" val="3847411381"/>
                     </a:ext>
                   </a:extLst>
                 </a:gridCol>
-                <a:gridCol w="1923189">
+                <a:gridCol w="1941342">
                   <a:extLst>
                     <a:ext uri="{9D8B030D-6E8A-4147-A177-3AD203B41FA5}">
                       <a16:colId xmlns:a16="http://schemas.microsoft.com/office/drawing/2014/main" val="416933003"/>
@@ -5697,7 +5697,7 @@
                     <a:p>
                       <a:pPr algn="ctr"/>
                       <a:r>
-                        <a:rPr lang="fr-FR" sz="1600" b="0" i="0" u="none" strike="noStrike" kern="1200" dirty="0">
+                        <a:rPr lang="fr-FR" sz="1600" b="1" i="0" u="none" strike="noStrike" kern="1200" dirty="0">
                           <a:solidFill>
                             <a:schemeClr val="lt1"/>
                           </a:solidFill>
@@ -5709,7 +5709,7 @@
                         <a:t> </a:t>
                       </a:r>
                       <a:r>
-                        <a:rPr lang="fr-FR" sz="1600" b="0" i="0" u="none" strike="noStrike" kern="1200" dirty="0" err="1">
+                        <a:rPr lang="fr-FR" sz="1600" b="1" i="0" u="none" strike="noStrike" kern="1200" dirty="0" err="1">
                           <a:solidFill>
                             <a:schemeClr val="lt1"/>
                           </a:solidFill>
@@ -5721,7 +5721,7 @@
                         <a:t>coordinate</a:t>
                       </a:r>
                       <a:r>
-                        <a:rPr lang="fr-FR" sz="1600" b="0" i="0" u="none" strike="noStrike" kern="1200" dirty="0">
+                        <a:rPr lang="fr-FR" sz="1600" b="1" i="0" u="none" strike="noStrike" kern="1200" dirty="0">
                           <a:solidFill>
                             <a:schemeClr val="lt1"/>
                           </a:solidFill>
@@ -5732,7 +5732,7 @@
                         </a:rPr>
                         <a:t> system</a:t>
                       </a:r>
-                      <a:endParaRPr lang="en-US" sz="1600" dirty="0"/>
+                      <a:endParaRPr lang="en-US" sz="1600" b="1" dirty="0"/>
                     </a:p>
                   </a:txBody>
                   <a:tcPr/>
@@ -5744,7 +5744,7 @@
                     <a:p>
                       <a:pPr algn="ctr"/>
                       <a:r>
-                        <a:rPr lang="en-US" sz="1600" b="0" i="0" u="none" strike="noStrike" kern="1200" dirty="0">
+                        <a:rPr lang="en-US" sz="1600" b="1" i="0" u="none" strike="noStrike" kern="1200" dirty="0">
                           <a:solidFill>
                             <a:schemeClr val="lt1"/>
                           </a:solidFill>
@@ -5766,7 +5766,7 @@
                     <a:p>
                       <a:pPr algn="ctr"/>
                       <a:r>
-                        <a:rPr lang="en-US" sz="1600" b="0" i="0" u="none" strike="noStrike" kern="1200" dirty="0">
+                        <a:rPr lang="en-US" sz="1600" b="1" i="0" u="none" strike="noStrike" kern="1200" dirty="0">
                           <a:solidFill>
                             <a:schemeClr val="lt1"/>
                           </a:solidFill>
@@ -5788,7 +5788,7 @@
                     <a:p>
                       <a:pPr algn="ctr"/>
                       <a:r>
-                        <a:rPr lang="fr-FR" sz="1600" b="0" i="0" u="none" strike="noStrike" kern="1200" dirty="0">
+                        <a:rPr lang="fr-FR" sz="1600" b="1" i="0" u="none" strike="noStrike" kern="1200" dirty="0">
                           <a:solidFill>
                             <a:schemeClr val="lt1"/>
                           </a:solidFill>
@@ -5800,7 +5800,7 @@
                         <a:t>size of the range</a:t>
                       </a:r>
                       <a:r>
-                        <a:rPr lang="en-US" sz="1600" b="0" i="0" u="none" strike="noStrike" kern="1200" dirty="0">
+                        <a:rPr lang="en-US" sz="1600" b="1" i="0" u="none" strike="noStrike" kern="1200" dirty="0">
                           <a:solidFill>
                             <a:schemeClr val="lt1"/>
                           </a:solidFill>
@@ -5822,7 +5822,7 @@
                     <a:p>
                       <a:pPr algn="ctr"/>
                       <a:r>
-                        <a:rPr lang="en-US" sz="1600" b="0" i="0" u="none" strike="noStrike" kern="1200" dirty="0">
+                        <a:rPr lang="en-US" sz="1600" b="1" i="0" u="none" strike="noStrike" kern="1200" dirty="0">
                           <a:solidFill>
                             <a:schemeClr val="lt1"/>
                           </a:solidFill>
@@ -5844,7 +5844,7 @@
                     <a:p>
                       <a:pPr algn="ctr"/>
                       <a:r>
-                        <a:rPr lang="en-US" sz="1600" b="0" i="0" u="none" strike="noStrike" kern="1200" dirty="0">
+                        <a:rPr lang="en-US" sz="1600" b="1" i="0" u="none" strike="noStrike" kern="1200" dirty="0">
                           <a:solidFill>
                             <a:schemeClr val="lt1"/>
                           </a:solidFill>
@@ -5866,7 +5866,7 @@
                     <a:p>
                       <a:pPr algn="ctr"/>
                       <a:r>
-                        <a:rPr lang="en-US" sz="1600" b="0" i="0" u="none" strike="noStrike" kern="1200" dirty="0">
+                        <a:rPr lang="en-US" sz="1600" b="1" i="0" u="none" strike="noStrike" kern="1200" dirty="0">
                           <a:solidFill>
                             <a:schemeClr val="lt1"/>
                           </a:solidFill>
@@ -6708,7 +6708,31 @@
                           <a:ea typeface="+mn-ea"/>
                           <a:cs typeface="+mn-cs"/>
                         </a:rPr>
-                        <a:t>C, Perl, Python, Java, Ruby, JS</a:t>
+                        <a:t>Bash, C, C++, </a:t>
+                      </a:r>
+                      <a:r>
+                        <a:rPr lang="en-US" sz="1400" kern="1200" dirty="0" err="1">
+                          <a:solidFill>
+                            <a:schemeClr val="dk1"/>
+                          </a:solidFill>
+                          <a:effectLst/>
+                          <a:latin typeface="+mn-lt"/>
+                          <a:ea typeface="+mn-ea"/>
+                          <a:cs typeface="+mn-cs"/>
+                        </a:rPr>
+                        <a:t>ksh</a:t>
+                      </a:r>
+                      <a:r>
+                        <a:rPr lang="en-US" sz="1400" kern="1200" dirty="0">
+                          <a:solidFill>
+                            <a:schemeClr val="dk1"/>
+                          </a:solidFill>
+                          <a:effectLst/>
+                          <a:latin typeface="+mn-lt"/>
+                          <a:ea typeface="+mn-ea"/>
+                          <a:cs typeface="+mn-cs"/>
+                        </a:rPr>
+                        <a:t>, Go, Haskell, Java, JS, Perl, Python, PowerShell, Ruby, Rust, Scala</a:t>
                       </a:r>
                     </a:p>
                   </a:txBody>
@@ -7284,8 +7308,77 @@
                           <a:ea typeface="+mn-ea"/>
                           <a:cs typeface="+mn-cs"/>
                         </a:rPr>
-                        <a:t>Fortran, SASL, MATLAB</a:t>
-                      </a:r>
+                        <a:t>AWK, COBOL, Fortran, Julia, Lua, MATLAB, R, </a:t>
+                      </a:r>
+                      <a:r>
+                        <a:rPr lang="en-US" sz="1400" kern="1200" dirty="0" err="1">
+                          <a:solidFill>
+                            <a:schemeClr val="dk1"/>
+                          </a:solidFill>
+                          <a:effectLst/>
+                          <a:latin typeface="+mn-lt"/>
+                          <a:ea typeface="+mn-ea"/>
+                          <a:cs typeface="+mn-cs"/>
+                        </a:rPr>
+                        <a:t>sh</a:t>
+                      </a:r>
+                      <a:r>
+                        <a:rPr lang="en-US" sz="1400" kern="1200" dirty="0">
+                          <a:solidFill>
+                            <a:schemeClr val="dk1"/>
+                          </a:solidFill>
+                          <a:effectLst/>
+                          <a:latin typeface="+mn-lt"/>
+                          <a:ea typeface="+mn-ea"/>
+                          <a:cs typeface="+mn-cs"/>
+                        </a:rPr>
+                        <a:t>, XPath/</a:t>
+                      </a:r>
+                      <a:r>
+                        <a:rPr lang="en-US" sz="1400" kern="1200" dirty="0" err="1">
+                          <a:solidFill>
+                            <a:schemeClr val="dk1"/>
+                          </a:solidFill>
+                          <a:effectLst/>
+                          <a:latin typeface="+mn-lt"/>
+                          <a:ea typeface="+mn-ea"/>
+                          <a:cs typeface="+mn-cs"/>
+                        </a:rPr>
+                        <a:t>Xquery</a:t>
+                      </a:r>
+                      <a:r>
+                        <a:rPr lang="en-US" sz="1400" kern="1200" dirty="0">
+                          <a:solidFill>
+                            <a:schemeClr val="dk1"/>
+                          </a:solidFill>
+                          <a:effectLst/>
+                          <a:latin typeface="+mn-lt"/>
+                          <a:ea typeface="+mn-ea"/>
+                          <a:cs typeface="+mn-cs"/>
+                        </a:rPr>
+                        <a:t>, </a:t>
+                      </a:r>
+                      <a:r>
+                        <a:rPr lang="en-US" sz="1400" kern="1200" dirty="0" err="1">
+                          <a:solidFill>
+                            <a:schemeClr val="dk1"/>
+                          </a:solidFill>
+                          <a:effectLst/>
+                          <a:latin typeface="+mn-lt"/>
+                          <a:ea typeface="+mn-ea"/>
+                          <a:cs typeface="+mn-cs"/>
+                        </a:rPr>
+                        <a:t>zsh</a:t>
+                      </a:r>
+                      <a:endParaRPr lang="en-US" sz="1400" kern="1200" dirty="0">
+                        <a:solidFill>
+                          <a:schemeClr val="dk1"/>
+                        </a:solidFill>
+                        <a:effectLst/>
+                        <a:latin typeface="+mn-lt"/>
+                        <a:ea typeface="+mn-ea"/>
+                        <a:cs typeface="+mn-cs"/>
+                      </a:endParaRPr>
                     </a:p>
                   </a:txBody>
                   <a:tcPr/>
@@ -8132,7 +8225,7 @@
         </p:nvSpPr>
         <p:spPr>
           <a:xfrm>
-            <a:off x="2997722" y="168425"/>
+            <a:off x="4348220" y="0"/>
             <a:ext cx="739305" cy="461665"/>
           </a:xfrm>
           <a:prstGeom prst="rect">
@@ -8190,8 +8283,8 @@
         </p:nvSpPr>
         <p:spPr>
           <a:xfrm>
-            <a:off x="3230372" y="5984001"/>
-            <a:ext cx="6645148" cy="900246"/>
+            <a:off x="70270" y="5785406"/>
+            <a:ext cx="10536769" cy="1061829"/>
           </a:xfrm>
           <a:prstGeom prst="rect">
             <a:avLst/>
@@ -8258,6 +8351,19 @@
                 <a:hlinkClick r:id="rId6"/>
               </a:rPr>
               <a:t>https://plastid.readthedocs.io/en/latest/concepts/coordinates.html#conventions-used-in-plastid</a:t>
+            </a:r>
+            <a:endParaRPr lang="en-US" sz="1050" dirty="0"/>
+          </a:p>
+          <a:p>
+            <a:pPr marL="171450" indent="-171450">
+              <a:buFont typeface="Arial" panose="020B0604020202020204" pitchFamily="34" charset="0"/>
+              <a:buChar char="•"/>
+            </a:pPr>
+            <a:r>
+              <a:rPr lang="en-US" sz="1050" dirty="0">
+                <a:hlinkClick r:id="rId7"/>
+              </a:rPr>
+              <a:t>https://en.wikipedia.org/wiki/Comparison_of_programming_languages_%28array%29#Array%5Fsystem%5Fcross-reference%5Flist</a:t>
             </a:r>
             <a:endParaRPr lang="en-US" sz="1050" dirty="0"/>
           </a:p>

</xml_diff>